<commit_message>
finished up to lvl 1 pages
</commit_message>
<xml_diff>
--- a/MINI PROJECT 1 final.pptx
+++ b/MINI PROJECT 1 final.pptx
@@ -5,7 +5,7 @@
     <p:sldMasterId id="2147483760" r:id="rId1"/>
   </p:sldMasterIdLst>
   <p:sldIdLst>
-    <p:sldId id="277" r:id="rId2"/>
+    <p:sldId id="279" r:id="rId2"/>
     <p:sldId id="256" r:id="rId3"/>
     <p:sldId id="257" r:id="rId4"/>
     <p:sldId id="258" r:id="rId5"/>
@@ -130,7 +130,7 @@
       <p14:sectionLst xmlns:p14="http://schemas.microsoft.com/office/powerpoint/2010/main">
         <p14:section name="Default Section" id="{1512A41C-B419-492A-850A-5F50FB1176EE}">
           <p14:sldIdLst>
-            <p14:sldId id="277"/>
+            <p14:sldId id="279"/>
             <p14:sldId id="256"/>
           </p14:sldIdLst>
         </p14:section>
@@ -3574,8 +3574,16 @@
 </file>
 
 <file path=ppt/slides/slide1.xml><?xml version="1.0" encoding="utf-8"?>
-<p:sld xmlns:a="http://schemas.openxmlformats.org/drawingml/2006/main" xmlns:r="http://schemas.openxmlformats.org/officeDocument/2006/relationships" xmlns:p="http://schemas.openxmlformats.org/presentationml/2006/main">
+<p:sld xmlns:a="http://schemas.openxmlformats.org/drawingml/2006/main" xmlns:r="http://schemas.openxmlformats.org/officeDocument/2006/relationships" xmlns:p="http://schemas.openxmlformats.org/presentationml/2006/main" showMasterSp="0">
   <p:cSld>
+    <p:bg>
+      <p:bgPr>
+        <a:solidFill>
+          <a:schemeClr val="bg1"/>
+        </a:solidFill>
+        <a:effectLst/>
+      </p:bgPr>
+    </p:bg>
     <p:spTree>
       <p:nvGrpSpPr>
         <p:cNvPr id="1" name=""/>
@@ -3593,7 +3601,7 @@
     </p:spTree>
     <p:extLst>
       <p:ext uri="{BB962C8B-B14F-4D97-AF65-F5344CB8AC3E}">
-        <p14:creationId xmlns:p14="http://schemas.microsoft.com/office/powerpoint/2010/main" val="3959380907"/>
+        <p14:creationId xmlns:p14="http://schemas.microsoft.com/office/powerpoint/2010/main" val="2903302618"/>
       </p:ext>
     </p:extLst>
   </p:cSld>
@@ -10936,13 +10944,13 @@
   <p:clrMapOvr>
     <a:masterClrMapping/>
   </p:clrMapOvr>
-  <mc:AlternateContent xmlns:mc="http://schemas.openxmlformats.org/markup-compatibility/2006">
-    <mc:Choice xmlns:p159="http://schemas.microsoft.com/office/powerpoint/2015/09/main" Requires="p159">
+  <mc:AlternateContent xmlns:mc="http://schemas.openxmlformats.org/markup-compatibility/2006" xmlns:p159="http://schemas.microsoft.com/office/powerpoint/2015/09/main">
+    <mc:Choice Requires="p159">
       <p:transition xmlns:p14="http://schemas.microsoft.com/office/powerpoint/2010/main" spd="slow" p14:dur="2000">
         <p159:morph option="byObject"/>
       </p:transition>
     </mc:Choice>
-    <mc:Fallback>
+    <mc:Fallback xmlns="">
       <p:transition spd="slow">
         <p:fade/>
       </p:transition>

</xml_diff>

<commit_message>
fixed all with javascripts
</commit_message>
<xml_diff>
--- a/MINI PROJECT 1 final.pptx
+++ b/MINI PROJECT 1 final.pptx
@@ -386,7 +386,7 @@
           <a:p>
             <a:fld id="{D9962669-56AE-4347-90EE-8C5DDA719B74}" type="datetimeFigureOut">
               <a:rPr lang="en-PH" smtClean="0"/>
-              <a:t>03/02/2023</a:t>
+              <a:t>11/02/2023</a:t>
             </a:fld>
             <a:endParaRPr lang="en-PH"/>
           </a:p>
@@ -568,7 +568,7 @@
           <a:p>
             <a:fld id="{D9962669-56AE-4347-90EE-8C5DDA719B74}" type="datetimeFigureOut">
               <a:rPr lang="en-PH" smtClean="0"/>
-              <a:t>03/02/2023</a:t>
+              <a:t>11/02/2023</a:t>
             </a:fld>
             <a:endParaRPr lang="en-PH"/>
           </a:p>
@@ -803,7 +803,7 @@
           <a:p>
             <a:fld id="{D9962669-56AE-4347-90EE-8C5DDA719B74}" type="datetimeFigureOut">
               <a:rPr lang="en-PH" smtClean="0"/>
-              <a:t>03/02/2023</a:t>
+              <a:t>11/02/2023</a:t>
             </a:fld>
             <a:endParaRPr lang="en-PH"/>
           </a:p>
@@ -995,7 +995,7 @@
           <a:p>
             <a:fld id="{D9962669-56AE-4347-90EE-8C5DDA719B74}" type="datetimeFigureOut">
               <a:rPr lang="en-PH" smtClean="0"/>
-              <a:t>03/02/2023</a:t>
+              <a:t>11/02/2023</a:t>
             </a:fld>
             <a:endParaRPr lang="en-PH"/>
           </a:p>
@@ -1313,7 +1313,7 @@
           <a:p>
             <a:fld id="{D9962669-56AE-4347-90EE-8C5DDA719B74}" type="datetimeFigureOut">
               <a:rPr lang="en-PH" smtClean="0"/>
-              <a:t>03/02/2023</a:t>
+              <a:t>11/02/2023</a:t>
             </a:fld>
             <a:endParaRPr lang="en-PH"/>
           </a:p>
@@ -1629,7 +1629,7 @@
           <a:p>
             <a:fld id="{D9962669-56AE-4347-90EE-8C5DDA719B74}" type="datetimeFigureOut">
               <a:rPr lang="en-PH" smtClean="0"/>
-              <a:t>03/02/2023</a:t>
+              <a:t>11/02/2023</a:t>
             </a:fld>
             <a:endParaRPr lang="en-PH"/>
           </a:p>
@@ -2063,7 +2063,7 @@
           <a:p>
             <a:fld id="{D9962669-56AE-4347-90EE-8C5DDA719B74}" type="datetimeFigureOut">
               <a:rPr lang="en-PH" smtClean="0"/>
-              <a:t>03/02/2023</a:t>
+              <a:t>11/02/2023</a:t>
             </a:fld>
             <a:endParaRPr lang="en-PH"/>
           </a:p>
@@ -2193,7 +2193,7 @@
           <a:p>
             <a:fld id="{D9962669-56AE-4347-90EE-8C5DDA719B74}" type="datetimeFigureOut">
               <a:rPr lang="en-PH" smtClean="0"/>
-              <a:t>03/02/2023</a:t>
+              <a:t>11/02/2023</a:t>
             </a:fld>
             <a:endParaRPr lang="en-PH"/>
           </a:p>
@@ -2300,7 +2300,7 @@
           <a:p>
             <a:fld id="{D9962669-56AE-4347-90EE-8C5DDA719B74}" type="datetimeFigureOut">
               <a:rPr lang="en-PH" smtClean="0"/>
-              <a:t>03/02/2023</a:t>
+              <a:t>11/02/2023</a:t>
             </a:fld>
             <a:endParaRPr lang="en-PH"/>
           </a:p>
@@ -2585,7 +2585,7 @@
           <a:p>
             <a:fld id="{D9962669-56AE-4347-90EE-8C5DDA719B74}" type="datetimeFigureOut">
               <a:rPr lang="en-PH" smtClean="0"/>
-              <a:t>03/02/2023</a:t>
+              <a:t>11/02/2023</a:t>
             </a:fld>
             <a:endParaRPr lang="en-PH"/>
           </a:p>
@@ -2862,7 +2862,7 @@
           <a:p>
             <a:fld id="{D9962669-56AE-4347-90EE-8C5DDA719B74}" type="datetimeFigureOut">
               <a:rPr lang="en-PH" smtClean="0"/>
-              <a:t>03/02/2023</a:t>
+              <a:t>11/02/2023</a:t>
             </a:fld>
             <a:endParaRPr lang="en-PH"/>
           </a:p>
@@ -3123,7 +3123,7 @@
           <a:p>
             <a:fld id="{D9962669-56AE-4347-90EE-8C5DDA719B74}" type="datetimeFigureOut">
               <a:rPr lang="en-PH" smtClean="0"/>
-              <a:t>03/02/2023</a:t>
+              <a:t>11/02/2023</a:t>
             </a:fld>
             <a:endParaRPr lang="en-PH"/>
           </a:p>
@@ -10871,36 +10871,26 @@
         </p:nvSpPr>
         <p:spPr>
           <a:xfrm>
-            <a:off x="1202919" y="1842655"/>
-            <a:ext cx="9784080" cy="5015345"/>
+            <a:off x="-581890" y="1842655"/>
+            <a:ext cx="13078690" cy="5015345"/>
           </a:xfrm>
         </p:spPr>
         <p:txBody>
-          <a:bodyPr anchor="ctr"/>
+          <a:bodyPr anchor="ctr">
+            <a:normAutofit/>
+          </a:bodyPr>
           <a:lstStyle/>
           <a:p>
             <a:pPr marL="0" indent="0" algn="ctr">
               <a:buNone/>
             </a:pPr>
-            <a:endParaRPr lang="en-PH" sz="5400" dirty="0"/>
-          </a:p>
-          <a:p>
-            <a:pPr marL="0" indent="0" algn="ctr">
-              <a:buNone/>
-            </a:pPr>
-            <a:r>
-              <a:rPr lang="en-PH" sz="5400" dirty="0">
-                <a:hlinkClick r:id="rId2"/>
+            <a:r>
+              <a:rPr lang="en-PH" sz="4000" dirty="0">
+                <a:hlinkClick r:id="rId2" action="ppaction://hlinkfile"/>
               </a:rPr>
-              <a:t>http://localhost/www.portfolio.com/miniproject1/index.html</a:t>
-            </a:r>
-            <a:endParaRPr lang="en-PH" sz="5400" dirty="0"/>
-          </a:p>
-          <a:p>
-            <a:pPr marL="0" indent="0" algn="ctr">
-              <a:buNone/>
-            </a:pPr>
-            <a:endParaRPr lang="en-PH" dirty="0"/>
+              <a:t>http://www.portfolio.com.test/miniproject1/index.html</a:t>
+            </a:r>
+            <a:endParaRPr lang="en-PH" sz="4000" dirty="0"/>
           </a:p>
         </p:txBody>
       </p:sp>
@@ -10997,8 +10987,8 @@
         </p:nvSpPr>
         <p:spPr>
           <a:xfrm>
-            <a:off x="838200" y="1272209"/>
-            <a:ext cx="10571922" cy="5088834"/>
+            <a:off x="838200" y="1272208"/>
+            <a:ext cx="10571922" cy="5585791"/>
           </a:xfrm>
         </p:spPr>
         <p:txBody>
@@ -11006,6 +10996,170 @@
             <a:noAutofit/>
           </a:bodyPr>
           <a:lstStyle/>
+          <a:p>
+            <a:pPr marL="617220" indent="0" algn="just" fontAlgn="base">
+              <a:lnSpc>
+                <a:spcPct val="107000"/>
+              </a:lnSpc>
+              <a:spcAft>
+                <a:spcPts val="1800"/>
+              </a:spcAft>
+              <a:buNone/>
+            </a:pPr>
+            <a:r>
+              <a:rPr lang="en-US" sz="2400" dirty="0">
+                <a:solidFill>
+                  <a:schemeClr val="bg1"/>
+                </a:solidFill>
+                <a:effectLst/>
+                <a:latin typeface="Calibri" panose="020F0502020204030204" pitchFamily="34" charset="0"/>
+                <a:cs typeface="Times New Roman" panose="02020603050405020304" pitchFamily="18" charset="0"/>
+              </a:rPr>
+              <a:t>	</a:t>
+            </a:r>
+            <a:r>
+              <a:rPr lang="en-US" sz="2400" i="1" dirty="0">
+                <a:solidFill>
+                  <a:schemeClr val="bg1"/>
+                </a:solidFill>
+                <a:latin typeface="Calibri" panose="020F0502020204030204" pitchFamily="34" charset="0"/>
+                <a:cs typeface="Times New Roman" panose="02020603050405020304" pitchFamily="18" charset="0"/>
+              </a:rPr>
+              <a:t>		</a:t>
+            </a:r>
+          </a:p>
+          <a:p>
+            <a:pPr marL="617220" indent="0" algn="just" fontAlgn="base">
+              <a:lnSpc>
+                <a:spcPct val="107000"/>
+              </a:lnSpc>
+              <a:spcAft>
+                <a:spcPts val="1800"/>
+              </a:spcAft>
+              <a:buNone/>
+            </a:pPr>
+            <a:r>
+              <a:rPr lang="en-US" sz="2400" i="1" dirty="0">
+                <a:solidFill>
+                  <a:schemeClr val="bg2"/>
+                </a:solidFill>
+                <a:latin typeface="Calibri" panose="020F0502020204030204" pitchFamily="34" charset="0"/>
+                <a:cs typeface="Times New Roman" panose="02020603050405020304" pitchFamily="18" charset="0"/>
+              </a:rPr>
+              <a:t>"If you want to become a scientist, learn from scientists. But if you want to become a millionaire, learn from millionaires." -Anonymous.</a:t>
+            </a:r>
+            <a:r>
+              <a:rPr lang="en-US" sz="2400" dirty="0">
+                <a:solidFill>
+                  <a:schemeClr val="bg2"/>
+                </a:solidFill>
+                <a:latin typeface="Calibri" panose="020F0502020204030204" pitchFamily="34" charset="0"/>
+                <a:cs typeface="Times New Roman" panose="02020603050405020304" pitchFamily="18" charset="0"/>
+              </a:rPr>
+              <a:t> </a:t>
+            </a:r>
+          </a:p>
+          <a:p>
+            <a:pPr marL="617220" indent="0" algn="just" fontAlgn="base">
+              <a:lnSpc>
+                <a:spcPct val="107000"/>
+              </a:lnSpc>
+              <a:spcAft>
+                <a:spcPts val="1800"/>
+              </a:spcAft>
+              <a:buNone/>
+            </a:pPr>
+            <a:r>
+              <a:rPr lang="en-US" sz="2400" dirty="0">
+                <a:solidFill>
+                  <a:schemeClr val="bg2"/>
+                </a:solidFill>
+                <a:latin typeface="Calibri" panose="020F0502020204030204" pitchFamily="34" charset="0"/>
+                <a:cs typeface="Times New Roman" panose="02020603050405020304" pitchFamily="18" charset="0"/>
+              </a:rPr>
+              <a:t>		It can be stressful and time-consuming, and it can be difficult to keep track of everything while you're away from your business.</a:t>
+            </a:r>
+          </a:p>
+          <a:p>
+            <a:pPr marL="502920" indent="0" fontAlgn="base">
+              <a:lnSpc>
+                <a:spcPct val="107000"/>
+              </a:lnSpc>
+              <a:spcAft>
+                <a:spcPts val="1800"/>
+              </a:spcAft>
+              <a:buNone/>
+            </a:pPr>
+            <a:r>
+              <a:rPr lang="en-US" sz="2400" dirty="0">
+                <a:solidFill>
+                  <a:schemeClr val="bg2"/>
+                </a:solidFill>
+                <a:latin typeface="Calibri" panose="020F0502020204030204" pitchFamily="34" charset="0"/>
+                <a:ea typeface="等线" panose="020B0503020204020204" pitchFamily="2" charset="-122"/>
+                <a:cs typeface="Times New Roman" panose="02020603050405020304" pitchFamily="18" charset="0"/>
+              </a:rPr>
+              <a:t>		But with our inventory management system, </a:t>
+            </a:r>
+            <a:r>
+              <a:rPr lang="en-US" sz="2400" dirty="0">
+                <a:solidFill>
+                  <a:schemeClr val="bg2"/>
+                </a:solidFill>
+                <a:latin typeface="Calibri" panose="020F0502020204030204" pitchFamily="34" charset="0"/>
+                <a:cs typeface="Times New Roman" panose="02020603050405020304" pitchFamily="18" charset="0"/>
+              </a:rPr>
+              <a:t>you can stay in control of your business no matter where you are. </a:t>
+            </a:r>
+          </a:p>
+          <a:p>
+            <a:pPr marL="502920" indent="0" fontAlgn="base">
+              <a:lnSpc>
+                <a:spcPct val="107000"/>
+              </a:lnSpc>
+              <a:spcAft>
+                <a:spcPts val="1800"/>
+              </a:spcAft>
+              <a:buNone/>
+            </a:pPr>
+            <a:r>
+              <a:rPr lang="en-US" sz="2400" b="1" i="1" dirty="0">
+                <a:solidFill>
+                  <a:schemeClr val="bg2"/>
+                </a:solidFill>
+                <a:latin typeface="Calibri" panose="020F0502020204030204" pitchFamily="34" charset="0"/>
+                <a:cs typeface="Times New Roman" panose="02020603050405020304" pitchFamily="18" charset="0"/>
+              </a:rPr>
+              <a:t>Time is Money</a:t>
+            </a:r>
+            <a:r>
+              <a:rPr lang="en-US" sz="2400" dirty="0">
+                <a:solidFill>
+                  <a:schemeClr val="bg2"/>
+                </a:solidFill>
+                <a:latin typeface="Calibri" panose="020F0502020204030204" pitchFamily="34" charset="0"/>
+                <a:cs typeface="Times New Roman" panose="02020603050405020304" pitchFamily="18" charset="0"/>
+              </a:rPr>
+              <a:t> </a:t>
+            </a:r>
+            <a:r>
+              <a:rPr lang="en-US" sz="2400" b="1" i="1" dirty="0">
+                <a:solidFill>
+                  <a:schemeClr val="bg2"/>
+                </a:solidFill>
+                <a:latin typeface="Calibri" panose="020F0502020204030204" pitchFamily="34" charset="0"/>
+                <a:cs typeface="Times New Roman" panose="02020603050405020304" pitchFamily="18" charset="0"/>
+              </a:rPr>
+              <a:t>And with our inventory management system, you'll save both.</a:t>
+            </a:r>
+            <a:endParaRPr lang="en-US" sz="2400" dirty="0">
+              <a:solidFill>
+                <a:schemeClr val="bg2"/>
+              </a:solidFill>
+              <a:latin typeface="Calibri" panose="020F0502020204030204" pitchFamily="34" charset="0"/>
+              <a:cs typeface="Times New Roman" panose="02020603050405020304" pitchFamily="18" charset="0"/>
+            </a:endParaRPr>
+          </a:p>
           <a:p>
             <a:pPr marL="457200" indent="0" algn="just" fontAlgn="base">
               <a:lnSpc>
@@ -11016,134 +11170,6 @@
               </a:spcAft>
               <a:buNone/>
             </a:pPr>
-            <a:r>
-              <a:rPr lang="en-US" sz="2400" dirty="0">
-                <a:effectLst/>
-                <a:latin typeface="Calibri" panose="020F0502020204030204" pitchFamily="34" charset="0"/>
-                <a:cs typeface="Times New Roman" panose="02020603050405020304" pitchFamily="18" charset="0"/>
-              </a:rPr>
-              <a:t>	</a:t>
-            </a:r>
-          </a:p>
-          <a:p>
-            <a:pPr marL="800100" algn="just" fontAlgn="base">
-              <a:lnSpc>
-                <a:spcPct val="107000"/>
-              </a:lnSpc>
-              <a:spcAft>
-                <a:spcPts val="1800"/>
-              </a:spcAft>
-            </a:pPr>
-            <a:r>
-              <a:rPr lang="en-US" sz="2400" i="1" dirty="0">
-                <a:effectLst/>
-                <a:latin typeface="Calibri" panose="020F0502020204030204" pitchFamily="34" charset="0"/>
-                <a:cs typeface="Times New Roman" panose="02020603050405020304" pitchFamily="18" charset="0"/>
-              </a:rPr>
-              <a:t>		"If you want to become a scientist, learn from scientists. But if you want to become a millionaire, learn from millionaires." -Anonymous.</a:t>
-            </a:r>
-            <a:r>
-              <a:rPr lang="en-US" sz="2400" dirty="0">
-                <a:effectLst/>
-                <a:latin typeface="Calibri" panose="020F0502020204030204" pitchFamily="34" charset="0"/>
-                <a:cs typeface="Times New Roman" panose="02020603050405020304" pitchFamily="18" charset="0"/>
-              </a:rPr>
-              <a:t> </a:t>
-            </a:r>
-          </a:p>
-          <a:p>
-            <a:pPr marL="800100" algn="just" fontAlgn="base">
-              <a:lnSpc>
-                <a:spcPct val="107000"/>
-              </a:lnSpc>
-              <a:spcAft>
-                <a:spcPts val="1800"/>
-              </a:spcAft>
-            </a:pPr>
-            <a:r>
-              <a:rPr lang="en-US" sz="2400" dirty="0">
-                <a:effectLst/>
-                <a:latin typeface="Calibri" panose="020F0502020204030204" pitchFamily="34" charset="0"/>
-                <a:cs typeface="Times New Roman" panose="02020603050405020304" pitchFamily="18" charset="0"/>
-              </a:rPr>
-              <a:t>		It can be stressful and time-consuming, and it can be difficult to keep track of everything while you're away from your business.</a:t>
-            </a:r>
-          </a:p>
-          <a:p>
-            <a:pPr marL="685800" fontAlgn="base">
-              <a:lnSpc>
-                <a:spcPct val="107000"/>
-              </a:lnSpc>
-              <a:spcAft>
-                <a:spcPts val="1800"/>
-              </a:spcAft>
-            </a:pPr>
-            <a:r>
-              <a:rPr lang="en-US" sz="2400" kern="1200" dirty="0">
-                <a:solidFill>
-                  <a:srgbClr val="000000"/>
-                </a:solidFill>
-                <a:effectLst/>
-                <a:latin typeface="Calibri" panose="020F0502020204030204" pitchFamily="34" charset="0"/>
-                <a:ea typeface="等线" panose="020B0503020204020204" pitchFamily="2" charset="-122"/>
-                <a:cs typeface="Times New Roman" panose="02020603050405020304" pitchFamily="18" charset="0"/>
-              </a:rPr>
-              <a:t>		</a:t>
-            </a:r>
-            <a:r>
-              <a:rPr lang="en-US" sz="2400" kern="1200" dirty="0">
-                <a:solidFill>
-                  <a:schemeClr val="tx1"/>
-                </a:solidFill>
-                <a:effectLst/>
-                <a:latin typeface="Calibri" panose="020F0502020204030204" pitchFamily="34" charset="0"/>
-                <a:ea typeface="等线" panose="020B0503020204020204" pitchFamily="2" charset="-122"/>
-                <a:cs typeface="Times New Roman" panose="02020603050405020304" pitchFamily="18" charset="0"/>
-              </a:rPr>
-              <a:t>But with our inventory management system, </a:t>
-            </a:r>
-            <a:r>
-              <a:rPr lang="en-US" sz="2400" dirty="0">
-                <a:effectLst/>
-                <a:latin typeface="Calibri" panose="020F0502020204030204" pitchFamily="34" charset="0"/>
-                <a:cs typeface="Times New Roman" panose="02020603050405020304" pitchFamily="18" charset="0"/>
-              </a:rPr>
-              <a:t>you can stay in control of your business no matter where you are. </a:t>
-            </a:r>
-          </a:p>
-          <a:p>
-            <a:pPr marL="685800" fontAlgn="base">
-              <a:lnSpc>
-                <a:spcPct val="107000"/>
-              </a:lnSpc>
-              <a:spcAft>
-                <a:spcPts val="1800"/>
-              </a:spcAft>
-            </a:pPr>
-            <a:r>
-              <a:rPr lang="en-US" sz="2400" b="1" i="1" dirty="0">
-                <a:effectLst/>
-                <a:latin typeface="Calibri" panose="020F0502020204030204" pitchFamily="34" charset="0"/>
-                <a:cs typeface="Times New Roman" panose="02020603050405020304" pitchFamily="18" charset="0"/>
-              </a:rPr>
-              <a:t>Time is Money</a:t>
-            </a:r>
-            <a:r>
-              <a:rPr lang="en-US" sz="2400" dirty="0">
-                <a:effectLst/>
-                <a:latin typeface="Calibri" panose="020F0502020204030204" pitchFamily="34" charset="0"/>
-                <a:cs typeface="Times New Roman" panose="02020603050405020304" pitchFamily="18" charset="0"/>
-              </a:rPr>
-              <a:t> </a:t>
-            </a:r>
-            <a:r>
-              <a:rPr lang="en-US" sz="2400" b="1" i="1" dirty="0">
-                <a:effectLst/>
-                <a:latin typeface="Calibri" panose="020F0502020204030204" pitchFamily="34" charset="0"/>
-                <a:cs typeface="Times New Roman" panose="02020603050405020304" pitchFamily="18" charset="0"/>
-              </a:rPr>
-              <a:t>And with our inventory management system, you'll save both.</a:t>
-            </a:r>
             <a:endParaRPr lang="en-US" sz="2400" dirty="0">
               <a:effectLst/>
               <a:latin typeface="Calibri" panose="020F0502020204030204" pitchFamily="34" charset="0"/>
@@ -11157,13 +11183,13 @@
   <p:clrMapOvr>
     <a:masterClrMapping/>
   </p:clrMapOvr>
-  <mc:AlternateContent xmlns:mc="http://schemas.openxmlformats.org/markup-compatibility/2006" xmlns:p159="http://schemas.microsoft.com/office/powerpoint/2015/09/main">
-    <mc:Choice Requires="p159">
+  <mc:AlternateContent xmlns:mc="http://schemas.openxmlformats.org/markup-compatibility/2006">
+    <mc:Choice xmlns:p159="http://schemas.microsoft.com/office/powerpoint/2015/09/main" Requires="p159">
       <p:transition xmlns:p14="http://schemas.microsoft.com/office/powerpoint/2010/main" spd="slow" p14:dur="2000">
-        <p159:morph option="byObject"/>
+        <p159:morph option="byChar"/>
       </p:transition>
     </mc:Choice>
-    <mc:Fallback xmlns="">
+    <mc:Fallback>
       <p:transition spd="slow">
         <p:fade/>
       </p:transition>
@@ -11214,7 +11240,7 @@
                                       </p:cBhvr>
                                       <p:to>
                                         <p:clrVal>
-                                          <a:schemeClr val="accent2"/>
+                                          <a:srgbClr val="2C2C2C"/>
                                         </p:clrVal>
                                       </p:to>
                                     </p:set>
@@ -11234,7 +11260,7 @@
                                       </p:cBhvr>
                                       <p:to>
                                         <p:clrVal>
-                                          <a:schemeClr val="accent2"/>
+                                          <a:srgbClr val="2C2C2C"/>
                                         </p:clrVal>
                                       </p:to>
                                     </p:set>
@@ -11302,7 +11328,7 @@
                                       </p:cBhvr>
                                       <p:to>
                                         <p:clrVal>
-                                          <a:schemeClr val="accent2"/>
+                                          <a:srgbClr val="2C2C2C"/>
                                         </p:clrVal>
                                       </p:to>
                                     </p:set>
@@ -11322,7 +11348,7 @@
                                       </p:cBhvr>
                                       <p:to>
                                         <p:clrVal>
-                                          <a:schemeClr val="accent2"/>
+                                          <a:srgbClr val="2C2C2C"/>
                                         </p:clrVal>
                                       </p:to>
                                     </p:set>
@@ -11390,7 +11416,7 @@
                                       </p:cBhvr>
                                       <p:to>
                                         <p:clrVal>
-                                          <a:schemeClr val="accent2"/>
+                                          <a:srgbClr val="2C2C2C"/>
                                         </p:clrVal>
                                       </p:to>
                                     </p:set>
@@ -11410,7 +11436,7 @@
                                       </p:cBhvr>
                                       <p:to>
                                         <p:clrVal>
-                                          <a:schemeClr val="accent2"/>
+                                          <a:srgbClr val="2C2C2C"/>
                                         </p:clrVal>
                                       </p:to>
                                     </p:set>
@@ -11478,7 +11504,7 @@
                                       </p:cBhvr>
                                       <p:to>
                                         <p:clrVal>
-                                          <a:schemeClr val="accent2"/>
+                                          <a:srgbClr val="2C2C2C"/>
                                         </p:clrVal>
                                       </p:to>
                                     </p:set>
@@ -11498,7 +11524,7 @@
                                       </p:cBhvr>
                                       <p:to>
                                         <p:clrVal>
-                                          <a:schemeClr val="accent2"/>
+                                          <a:srgbClr val="2C2C2C"/>
                                         </p:clrVal>
                                       </p:to>
                                     </p:set>

</xml_diff>